<commit_message>
update Style.css, index.html & all menus
</commit_message>
<xml_diff>
--- a/SUPPORT PROJET N°3.pptx
+++ b/SUPPORT PROJET N°3.pptx
@@ -108,6 +108,11 @@
       </a:defRPr>
     </a:lvl9pPr>
   </p:defaultTextStyle>
+  <p:extLst>
+    <p:ext uri="{EFAFB233-063F-42B5-8137-9DF3F51BA10A}">
+      <p15:sldGuideLst xmlns:p15="http://schemas.microsoft.com/office/powerpoint/2012/main"/>
+    </p:ext>
+  </p:extLst>
 </p:presentation>
 </file>
 
@@ -838,7 +843,7 @@
             <a:fld id="{B61BEF0D-F0BB-DE4B-95CE-6DB70DBA9567}" type="datetimeFigureOut">
               <a:rPr lang="en-US" dirty="0"/>
               <a:pPr/>
-              <a:t>3/9/2023</a:t>
+              <a:t>3/10/2023</a:t>
             </a:fld>
             <a:endParaRPr lang="en-US" dirty="0"/>
           </a:p>
@@ -1086,7 +1091,7 @@
             <a:fld id="{B61BEF0D-F0BB-DE4B-95CE-6DB70DBA9567}" type="datetimeFigureOut">
               <a:rPr lang="en-US" dirty="0"/>
               <a:pPr/>
-              <a:t>3/9/2023</a:t>
+              <a:t>3/10/2023</a:t>
             </a:fld>
             <a:endParaRPr lang="en-US" dirty="0"/>
           </a:p>
@@ -1397,7 +1402,7 @@
             <a:fld id="{B61BEF0D-F0BB-DE4B-95CE-6DB70DBA9567}" type="datetimeFigureOut">
               <a:rPr lang="en-US" dirty="0"/>
               <a:pPr/>
-              <a:t>3/9/2023</a:t>
+              <a:t>3/10/2023</a:t>
             </a:fld>
             <a:endParaRPr lang="en-US" dirty="0"/>
           </a:p>
@@ -1721,7 +1726,7 @@
             <a:fld id="{B61BEF0D-F0BB-DE4B-95CE-6DB70DBA9567}" type="datetimeFigureOut">
               <a:rPr lang="en-US" dirty="0"/>
               <a:pPr/>
-              <a:t>3/9/2023</a:t>
+              <a:t>3/10/2023</a:t>
             </a:fld>
             <a:endParaRPr lang="en-US" dirty="0"/>
           </a:p>
@@ -2032,7 +2037,7 @@
             <a:fld id="{B61BEF0D-F0BB-DE4B-95CE-6DB70DBA9567}" type="datetimeFigureOut">
               <a:rPr lang="en-US" dirty="0"/>
               <a:pPr/>
-              <a:t>3/9/2023</a:t>
+              <a:t>3/10/2023</a:t>
             </a:fld>
             <a:endParaRPr lang="en-US" dirty="0"/>
           </a:p>
@@ -2416,7 +2421,7 @@
             <a:fld id="{B61BEF0D-F0BB-DE4B-95CE-6DB70DBA9567}" type="datetimeFigureOut">
               <a:rPr lang="en-US" dirty="0"/>
               <a:pPr/>
-              <a:t>3/9/2023</a:t>
+              <a:t>3/10/2023</a:t>
             </a:fld>
             <a:endParaRPr lang="en-US" dirty="0"/>
           </a:p>
@@ -2582,7 +2587,7 @@
           <a:p>
             <a:fld id="{55C6B4A9-1611-4792-9094-5F34BCA07E0B}" type="datetimeFigureOut">
               <a:rPr lang="en-US" dirty="0"/>
-              <a:t>3/9/2023</a:t>
+              <a:t>3/10/2023</a:t>
             </a:fld>
             <a:endParaRPr lang="en-US" dirty="0"/>
           </a:p>
@@ -2758,7 +2763,7 @@
             <a:fld id="{B61BEF0D-F0BB-DE4B-95CE-6DB70DBA9567}" type="datetimeFigureOut">
               <a:rPr lang="en-US" dirty="0"/>
               <a:pPr/>
-              <a:t>3/9/2023</a:t>
+              <a:t>3/10/2023</a:t>
             </a:fld>
             <a:endParaRPr lang="en-US" dirty="0"/>
           </a:p>
@@ -2924,7 +2929,7 @@
           <a:p>
             <a:fld id="{42A54C80-263E-416B-A8E0-580EDEADCBDC}" type="datetimeFigureOut">
               <a:rPr lang="en-US" dirty="0"/>
-              <a:t>3/9/2023</a:t>
+              <a:t>3/10/2023</a:t>
             </a:fld>
             <a:endParaRPr lang="en-US" dirty="0"/>
           </a:p>
@@ -3167,7 +3172,7 @@
             <a:fld id="{B61BEF0D-F0BB-DE4B-95CE-6DB70DBA9567}" type="datetimeFigureOut">
               <a:rPr lang="en-US" dirty="0"/>
               <a:pPr/>
-              <a:t>3/9/2023</a:t>
+              <a:t>3/10/2023</a:t>
             </a:fld>
             <a:endParaRPr lang="en-US" dirty="0"/>
           </a:p>
@@ -3395,7 +3400,7 @@
           <a:p>
             <a:fld id="{42A54C80-263E-416B-A8E0-580EDEADCBDC}" type="datetimeFigureOut">
               <a:rPr lang="en-US" dirty="0"/>
-              <a:t>3/9/2023</a:t>
+              <a:t>3/10/2023</a:t>
             </a:fld>
             <a:endParaRPr lang="en-US" dirty="0"/>
           </a:p>
@@ -3765,7 +3770,7 @@
             <a:fld id="{B61BEF0D-F0BB-DE4B-95CE-6DB70DBA9567}" type="datetimeFigureOut">
               <a:rPr lang="en-US" dirty="0"/>
               <a:pPr/>
-              <a:t>3/9/2023</a:t>
+              <a:t>3/10/2023</a:t>
             </a:fld>
             <a:endParaRPr lang="en-US" dirty="0"/>
           </a:p>
@@ -3885,7 +3890,7 @@
             <a:fld id="{B61BEF0D-F0BB-DE4B-95CE-6DB70DBA9567}" type="datetimeFigureOut">
               <a:rPr lang="en-US" dirty="0"/>
               <a:pPr/>
-              <a:t>3/9/2023</a:t>
+              <a:t>3/10/2023</a:t>
             </a:fld>
             <a:endParaRPr lang="en-US" dirty="0"/>
           </a:p>
@@ -3977,7 +3982,7 @@
             <a:fld id="{B61BEF0D-F0BB-DE4B-95CE-6DB70DBA9567}" type="datetimeFigureOut">
               <a:rPr lang="en-US" dirty="0"/>
               <a:pPr/>
-              <a:t>3/9/2023</a:t>
+              <a:t>3/10/2023</a:t>
             </a:fld>
             <a:endParaRPr lang="en-US" dirty="0"/>
           </a:p>
@@ -4228,7 +4233,7 @@
           <a:p>
             <a:fld id="{42A54C80-263E-416B-A8E0-580EDEADCBDC}" type="datetimeFigureOut">
               <a:rPr lang="en-US" dirty="0"/>
-              <a:t>3/9/2023</a:t>
+              <a:t>3/10/2023</a:t>
             </a:fld>
             <a:endParaRPr lang="en-US" dirty="0"/>
           </a:p>
@@ -4487,7 +4492,7 @@
             <a:fld id="{B61BEF0D-F0BB-DE4B-95CE-6DB70DBA9567}" type="datetimeFigureOut">
               <a:rPr lang="en-US" dirty="0"/>
               <a:pPr/>
-              <a:t>3/9/2023</a:t>
+              <a:t>3/10/2023</a:t>
             </a:fld>
             <a:endParaRPr lang="en-US" dirty="0"/>
           </a:p>
@@ -5229,7 +5234,7 @@
             <a:fld id="{B61BEF0D-F0BB-DE4B-95CE-6DB70DBA9567}" type="datetimeFigureOut">
               <a:rPr lang="en-US" dirty="0"/>
               <a:pPr/>
-              <a:t>3/9/2023</a:t>
+              <a:t>3/10/2023</a:t>
             </a:fld>
             <a:endParaRPr lang="en-US" dirty="0"/>
           </a:p>
@@ -6717,7 +6722,15 @@
             </a:r>
             <a:r>
               <a:rPr lang="fr-FR" dirty="0" smtClean="0"/>
-              <a:t>(767PX – 1200X</a:t>
+              <a:t>(</a:t>
+            </a:r>
+            <a:r>
+              <a:rPr lang="fr-FR" dirty="0" smtClean="0"/>
+              <a:t>768PX </a:t>
+            </a:r>
+            <a:r>
+              <a:rPr lang="fr-FR" dirty="0" smtClean="0"/>
+              <a:t>– 1200X</a:t>
             </a:r>
             <a:r>
               <a:rPr lang="fr-FR" dirty="0"/>

</xml_diff>

<commit_message>
Update All (index.html, menu.html,style.css)
</commit_message>
<xml_diff>
--- a/SUPPORT PROJET N°3.pptx
+++ b/SUPPORT PROJET N°3.pptx
@@ -108,11 +108,6 @@
       </a:defRPr>
     </a:lvl9pPr>
   </p:defaultTextStyle>
-  <p:extLst>
-    <p:ext uri="{EFAFB233-063F-42B5-8137-9DF3F51BA10A}">
-      <p15:sldGuideLst xmlns:p15="http://schemas.microsoft.com/office/powerpoint/2012/main"/>
-    </p:ext>
-  </p:extLst>
 </p:presentation>
 </file>
 
@@ -843,7 +838,7 @@
             <a:fld id="{B61BEF0D-F0BB-DE4B-95CE-6DB70DBA9567}" type="datetimeFigureOut">
               <a:rPr lang="en-US" dirty="0"/>
               <a:pPr/>
-              <a:t>3/10/2023</a:t>
+              <a:t>3/9/2023</a:t>
             </a:fld>
             <a:endParaRPr lang="en-US" dirty="0"/>
           </a:p>
@@ -1091,7 +1086,7 @@
             <a:fld id="{B61BEF0D-F0BB-DE4B-95CE-6DB70DBA9567}" type="datetimeFigureOut">
               <a:rPr lang="en-US" dirty="0"/>
               <a:pPr/>
-              <a:t>3/10/2023</a:t>
+              <a:t>3/9/2023</a:t>
             </a:fld>
             <a:endParaRPr lang="en-US" dirty="0"/>
           </a:p>
@@ -1402,7 +1397,7 @@
             <a:fld id="{B61BEF0D-F0BB-DE4B-95CE-6DB70DBA9567}" type="datetimeFigureOut">
               <a:rPr lang="en-US" dirty="0"/>
               <a:pPr/>
-              <a:t>3/10/2023</a:t>
+              <a:t>3/9/2023</a:t>
             </a:fld>
             <a:endParaRPr lang="en-US" dirty="0"/>
           </a:p>
@@ -1726,7 +1721,7 @@
             <a:fld id="{B61BEF0D-F0BB-DE4B-95CE-6DB70DBA9567}" type="datetimeFigureOut">
               <a:rPr lang="en-US" dirty="0"/>
               <a:pPr/>
-              <a:t>3/10/2023</a:t>
+              <a:t>3/9/2023</a:t>
             </a:fld>
             <a:endParaRPr lang="en-US" dirty="0"/>
           </a:p>
@@ -2037,7 +2032,7 @@
             <a:fld id="{B61BEF0D-F0BB-DE4B-95CE-6DB70DBA9567}" type="datetimeFigureOut">
               <a:rPr lang="en-US" dirty="0"/>
               <a:pPr/>
-              <a:t>3/10/2023</a:t>
+              <a:t>3/9/2023</a:t>
             </a:fld>
             <a:endParaRPr lang="en-US" dirty="0"/>
           </a:p>
@@ -2421,7 +2416,7 @@
             <a:fld id="{B61BEF0D-F0BB-DE4B-95CE-6DB70DBA9567}" type="datetimeFigureOut">
               <a:rPr lang="en-US" dirty="0"/>
               <a:pPr/>
-              <a:t>3/10/2023</a:t>
+              <a:t>3/9/2023</a:t>
             </a:fld>
             <a:endParaRPr lang="en-US" dirty="0"/>
           </a:p>
@@ -2587,7 +2582,7 @@
           <a:p>
             <a:fld id="{55C6B4A9-1611-4792-9094-5F34BCA07E0B}" type="datetimeFigureOut">
               <a:rPr lang="en-US" dirty="0"/>
-              <a:t>3/10/2023</a:t>
+              <a:t>3/9/2023</a:t>
             </a:fld>
             <a:endParaRPr lang="en-US" dirty="0"/>
           </a:p>
@@ -2763,7 +2758,7 @@
             <a:fld id="{B61BEF0D-F0BB-DE4B-95CE-6DB70DBA9567}" type="datetimeFigureOut">
               <a:rPr lang="en-US" dirty="0"/>
               <a:pPr/>
-              <a:t>3/10/2023</a:t>
+              <a:t>3/9/2023</a:t>
             </a:fld>
             <a:endParaRPr lang="en-US" dirty="0"/>
           </a:p>
@@ -2929,7 +2924,7 @@
           <a:p>
             <a:fld id="{42A54C80-263E-416B-A8E0-580EDEADCBDC}" type="datetimeFigureOut">
               <a:rPr lang="en-US" dirty="0"/>
-              <a:t>3/10/2023</a:t>
+              <a:t>3/9/2023</a:t>
             </a:fld>
             <a:endParaRPr lang="en-US" dirty="0"/>
           </a:p>
@@ -3172,7 +3167,7 @@
             <a:fld id="{B61BEF0D-F0BB-DE4B-95CE-6DB70DBA9567}" type="datetimeFigureOut">
               <a:rPr lang="en-US" dirty="0"/>
               <a:pPr/>
-              <a:t>3/10/2023</a:t>
+              <a:t>3/9/2023</a:t>
             </a:fld>
             <a:endParaRPr lang="en-US" dirty="0"/>
           </a:p>
@@ -3400,7 +3395,7 @@
           <a:p>
             <a:fld id="{42A54C80-263E-416B-A8E0-580EDEADCBDC}" type="datetimeFigureOut">
               <a:rPr lang="en-US" dirty="0"/>
-              <a:t>3/10/2023</a:t>
+              <a:t>3/9/2023</a:t>
             </a:fld>
             <a:endParaRPr lang="en-US" dirty="0"/>
           </a:p>
@@ -3770,7 +3765,7 @@
             <a:fld id="{B61BEF0D-F0BB-DE4B-95CE-6DB70DBA9567}" type="datetimeFigureOut">
               <a:rPr lang="en-US" dirty="0"/>
               <a:pPr/>
-              <a:t>3/10/2023</a:t>
+              <a:t>3/9/2023</a:t>
             </a:fld>
             <a:endParaRPr lang="en-US" dirty="0"/>
           </a:p>
@@ -3890,7 +3885,7 @@
             <a:fld id="{B61BEF0D-F0BB-DE4B-95CE-6DB70DBA9567}" type="datetimeFigureOut">
               <a:rPr lang="en-US" dirty="0"/>
               <a:pPr/>
-              <a:t>3/10/2023</a:t>
+              <a:t>3/9/2023</a:t>
             </a:fld>
             <a:endParaRPr lang="en-US" dirty="0"/>
           </a:p>
@@ -3982,7 +3977,7 @@
             <a:fld id="{B61BEF0D-F0BB-DE4B-95CE-6DB70DBA9567}" type="datetimeFigureOut">
               <a:rPr lang="en-US" dirty="0"/>
               <a:pPr/>
-              <a:t>3/10/2023</a:t>
+              <a:t>3/9/2023</a:t>
             </a:fld>
             <a:endParaRPr lang="en-US" dirty="0"/>
           </a:p>
@@ -4233,7 +4228,7 @@
           <a:p>
             <a:fld id="{42A54C80-263E-416B-A8E0-580EDEADCBDC}" type="datetimeFigureOut">
               <a:rPr lang="en-US" dirty="0"/>
-              <a:t>3/10/2023</a:t>
+              <a:t>3/9/2023</a:t>
             </a:fld>
             <a:endParaRPr lang="en-US" dirty="0"/>
           </a:p>
@@ -4492,7 +4487,7 @@
             <a:fld id="{B61BEF0D-F0BB-DE4B-95CE-6DB70DBA9567}" type="datetimeFigureOut">
               <a:rPr lang="en-US" dirty="0"/>
               <a:pPr/>
-              <a:t>3/10/2023</a:t>
+              <a:t>3/9/2023</a:t>
             </a:fld>
             <a:endParaRPr lang="en-US" dirty="0"/>
           </a:p>
@@ -5234,7 +5229,7 @@
             <a:fld id="{B61BEF0D-F0BB-DE4B-95CE-6DB70DBA9567}" type="datetimeFigureOut">
               <a:rPr lang="en-US" dirty="0"/>
               <a:pPr/>
-              <a:t>3/10/2023</a:t>
+              <a:t>3/9/2023</a:t>
             </a:fld>
             <a:endParaRPr lang="en-US" dirty="0"/>
           </a:p>
@@ -6722,15 +6717,7 @@
             </a:r>
             <a:r>
               <a:rPr lang="fr-FR" dirty="0" smtClean="0"/>
-              <a:t>(</a:t>
-            </a:r>
-            <a:r>
-              <a:rPr lang="fr-FR" dirty="0" smtClean="0"/>
-              <a:t>768PX </a:t>
-            </a:r>
-            <a:r>
-              <a:rPr lang="fr-FR" dirty="0" smtClean="0"/>
-              <a:t>– 1200X</a:t>
+              <a:t>(767PX – 1200X</a:t>
             </a:r>
             <a:r>
               <a:rPr lang="fr-FR" dirty="0"/>

</xml_diff>

<commit_message>
Update index, style and menu
</commit_message>
<xml_diff>
--- a/SUPPORT PROJET N°3.pptx
+++ b/SUPPORT PROJET N°3.pptx
@@ -10,6 +10,11 @@
     <p:sldId id="258" r:id="rId4"/>
     <p:sldId id="259" r:id="rId5"/>
     <p:sldId id="260" r:id="rId6"/>
+    <p:sldId id="261" r:id="rId7"/>
+    <p:sldId id="262" r:id="rId8"/>
+    <p:sldId id="263" r:id="rId9"/>
+    <p:sldId id="264" r:id="rId10"/>
+    <p:sldId id="265" r:id="rId11"/>
   </p:sldIdLst>
   <p:sldSz cx="12192000" cy="6858000"/>
   <p:notesSz cx="6858000" cy="9144000"/>
@@ -108,6 +113,11 @@
       </a:defRPr>
     </a:lvl9pPr>
   </p:defaultTextStyle>
+  <p:extLst>
+    <p:ext uri="{EFAFB233-063F-42B5-8137-9DF3F51BA10A}">
+      <p15:sldGuideLst xmlns:p15="http://schemas.microsoft.com/office/powerpoint/2012/main"/>
+    </p:ext>
+  </p:extLst>
 </p:presentation>
 </file>
 
@@ -838,7 +848,7 @@
             <a:fld id="{B61BEF0D-F0BB-DE4B-95CE-6DB70DBA9567}" type="datetimeFigureOut">
               <a:rPr lang="en-US" dirty="0"/>
               <a:pPr/>
-              <a:t>3/9/2023</a:t>
+              <a:t>3/14/2023</a:t>
             </a:fld>
             <a:endParaRPr lang="en-US" dirty="0"/>
           </a:p>
@@ -1086,7 +1096,7 @@
             <a:fld id="{B61BEF0D-F0BB-DE4B-95CE-6DB70DBA9567}" type="datetimeFigureOut">
               <a:rPr lang="en-US" dirty="0"/>
               <a:pPr/>
-              <a:t>3/9/2023</a:t>
+              <a:t>3/14/2023</a:t>
             </a:fld>
             <a:endParaRPr lang="en-US" dirty="0"/>
           </a:p>
@@ -1397,7 +1407,7 @@
             <a:fld id="{B61BEF0D-F0BB-DE4B-95CE-6DB70DBA9567}" type="datetimeFigureOut">
               <a:rPr lang="en-US" dirty="0"/>
               <a:pPr/>
-              <a:t>3/9/2023</a:t>
+              <a:t>3/14/2023</a:t>
             </a:fld>
             <a:endParaRPr lang="en-US" dirty="0"/>
           </a:p>
@@ -1721,7 +1731,7 @@
             <a:fld id="{B61BEF0D-F0BB-DE4B-95CE-6DB70DBA9567}" type="datetimeFigureOut">
               <a:rPr lang="en-US" dirty="0"/>
               <a:pPr/>
-              <a:t>3/9/2023</a:t>
+              <a:t>3/14/2023</a:t>
             </a:fld>
             <a:endParaRPr lang="en-US" dirty="0"/>
           </a:p>
@@ -2032,7 +2042,7 @@
             <a:fld id="{B61BEF0D-F0BB-DE4B-95CE-6DB70DBA9567}" type="datetimeFigureOut">
               <a:rPr lang="en-US" dirty="0"/>
               <a:pPr/>
-              <a:t>3/9/2023</a:t>
+              <a:t>3/14/2023</a:t>
             </a:fld>
             <a:endParaRPr lang="en-US" dirty="0"/>
           </a:p>
@@ -2416,7 +2426,7 @@
             <a:fld id="{B61BEF0D-F0BB-DE4B-95CE-6DB70DBA9567}" type="datetimeFigureOut">
               <a:rPr lang="en-US" dirty="0"/>
               <a:pPr/>
-              <a:t>3/9/2023</a:t>
+              <a:t>3/14/2023</a:t>
             </a:fld>
             <a:endParaRPr lang="en-US" dirty="0"/>
           </a:p>
@@ -2582,7 +2592,7 @@
           <a:p>
             <a:fld id="{55C6B4A9-1611-4792-9094-5F34BCA07E0B}" type="datetimeFigureOut">
               <a:rPr lang="en-US" dirty="0"/>
-              <a:t>3/9/2023</a:t>
+              <a:t>3/14/2023</a:t>
             </a:fld>
             <a:endParaRPr lang="en-US" dirty="0"/>
           </a:p>
@@ -2758,7 +2768,7 @@
             <a:fld id="{B61BEF0D-F0BB-DE4B-95CE-6DB70DBA9567}" type="datetimeFigureOut">
               <a:rPr lang="en-US" dirty="0"/>
               <a:pPr/>
-              <a:t>3/9/2023</a:t>
+              <a:t>3/14/2023</a:t>
             </a:fld>
             <a:endParaRPr lang="en-US" dirty="0"/>
           </a:p>
@@ -2924,7 +2934,7 @@
           <a:p>
             <a:fld id="{42A54C80-263E-416B-A8E0-580EDEADCBDC}" type="datetimeFigureOut">
               <a:rPr lang="en-US" dirty="0"/>
-              <a:t>3/9/2023</a:t>
+              <a:t>3/14/2023</a:t>
             </a:fld>
             <a:endParaRPr lang="en-US" dirty="0"/>
           </a:p>
@@ -3167,7 +3177,7 @@
             <a:fld id="{B61BEF0D-F0BB-DE4B-95CE-6DB70DBA9567}" type="datetimeFigureOut">
               <a:rPr lang="en-US" dirty="0"/>
               <a:pPr/>
-              <a:t>3/9/2023</a:t>
+              <a:t>3/14/2023</a:t>
             </a:fld>
             <a:endParaRPr lang="en-US" dirty="0"/>
           </a:p>
@@ -3395,7 +3405,7 @@
           <a:p>
             <a:fld id="{42A54C80-263E-416B-A8E0-580EDEADCBDC}" type="datetimeFigureOut">
               <a:rPr lang="en-US" dirty="0"/>
-              <a:t>3/9/2023</a:t>
+              <a:t>3/14/2023</a:t>
             </a:fld>
             <a:endParaRPr lang="en-US" dirty="0"/>
           </a:p>
@@ -3765,7 +3775,7 @@
             <a:fld id="{B61BEF0D-F0BB-DE4B-95CE-6DB70DBA9567}" type="datetimeFigureOut">
               <a:rPr lang="en-US" dirty="0"/>
               <a:pPr/>
-              <a:t>3/9/2023</a:t>
+              <a:t>3/14/2023</a:t>
             </a:fld>
             <a:endParaRPr lang="en-US" dirty="0"/>
           </a:p>
@@ -3885,7 +3895,7 @@
             <a:fld id="{B61BEF0D-F0BB-DE4B-95CE-6DB70DBA9567}" type="datetimeFigureOut">
               <a:rPr lang="en-US" dirty="0"/>
               <a:pPr/>
-              <a:t>3/9/2023</a:t>
+              <a:t>3/14/2023</a:t>
             </a:fld>
             <a:endParaRPr lang="en-US" dirty="0"/>
           </a:p>
@@ -3977,7 +3987,7 @@
             <a:fld id="{B61BEF0D-F0BB-DE4B-95CE-6DB70DBA9567}" type="datetimeFigureOut">
               <a:rPr lang="en-US" dirty="0"/>
               <a:pPr/>
-              <a:t>3/9/2023</a:t>
+              <a:t>3/14/2023</a:t>
             </a:fld>
             <a:endParaRPr lang="en-US" dirty="0"/>
           </a:p>
@@ -4228,7 +4238,7 @@
           <a:p>
             <a:fld id="{42A54C80-263E-416B-A8E0-580EDEADCBDC}" type="datetimeFigureOut">
               <a:rPr lang="en-US" dirty="0"/>
-              <a:t>3/9/2023</a:t>
+              <a:t>3/14/2023</a:t>
             </a:fld>
             <a:endParaRPr lang="en-US" dirty="0"/>
           </a:p>
@@ -4487,7 +4497,7 @@
             <a:fld id="{B61BEF0D-F0BB-DE4B-95CE-6DB70DBA9567}" type="datetimeFigureOut">
               <a:rPr lang="en-US" dirty="0"/>
               <a:pPr/>
-              <a:t>3/9/2023</a:t>
+              <a:t>3/14/2023</a:t>
             </a:fld>
             <a:endParaRPr lang="en-US" dirty="0"/>
           </a:p>
@@ -5229,7 +5239,7 @@
             <a:fld id="{B61BEF0D-F0BB-DE4B-95CE-6DB70DBA9567}" type="datetimeFigureOut">
               <a:rPr lang="en-US" dirty="0"/>
               <a:pPr/>
-              <a:t>3/9/2023</a:t>
+              <a:t>3/14/2023</a:t>
             </a:fld>
             <a:endParaRPr lang="en-US" dirty="0"/>
           </a:p>
@@ -5788,21 +5798,33 @@
           <a:p>
             <a:pPr algn="ctr"/>
             <a:r>
-              <a:rPr lang="fr-FR" dirty="0"/>
-              <a:t>SUPPORT PROJET N°3 </a:t>
+              <a:rPr lang="fr-FR" sz="4400" dirty="0"/>
+              <a:t>SUPPORT </a:t>
+            </a:r>
+            <a:r>
+              <a:rPr lang="fr-FR" sz="4400" dirty="0" smtClean="0"/>
+              <a:t>SOUTENANCE </a:t>
+            </a:r>
+            <a:r>
+              <a:rPr lang="fr-FR" sz="4400" dirty="0"/>
+              <a:t>N°3 </a:t>
+            </a:r>
+            <a:r>
+              <a:rPr lang="fr-FR" sz="4400" dirty="0" smtClean="0"/>
+              <a:t>:</a:t>
             </a:r>
             <a:r>
               <a:rPr lang="fr-FR" dirty="0" smtClean="0"/>
-              <a:t>:</a:t>
+              <a:t/>
             </a:r>
             <a:br>
               <a:rPr lang="fr-FR" dirty="0" smtClean="0"/>
             </a:br>
             <a:r>
-              <a:rPr lang="fr-FR" dirty="0" smtClean="0"/>
+              <a:rPr lang="fr-FR" b="1" dirty="0" smtClean="0"/>
               <a:t>OHMYFOOD</a:t>
             </a:r>
-            <a:endParaRPr lang="fr-FR" dirty="0"/>
+            <a:endParaRPr lang="fr-FR" b="1" dirty="0"/>
           </a:p>
         </p:txBody>
       </p:sp>
@@ -5810,6 +5832,94 @@
     <p:extLst>
       <p:ext uri="{BB962C8B-B14F-4D97-AF65-F5344CB8AC3E}">
         <p14:creationId xmlns:p14="http://schemas.microsoft.com/office/powerpoint/2010/main" val="4070628370"/>
+      </p:ext>
+    </p:extLst>
+  </p:cSld>
+  <p:clrMapOvr>
+    <a:masterClrMapping/>
+  </p:clrMapOvr>
+</p:sld>
+</file>
+
+<file path=ppt/slides/slide10.xml><?xml version="1.0" encoding="utf-8"?>
+<p:sld xmlns:a="http://schemas.openxmlformats.org/drawingml/2006/main" xmlns:r="http://schemas.openxmlformats.org/officeDocument/2006/relationships" xmlns:p="http://schemas.openxmlformats.org/presentationml/2006/main">
+  <p:cSld>
+    <p:spTree>
+      <p:nvGrpSpPr>
+        <p:cNvPr id="1" name=""/>
+        <p:cNvGrpSpPr/>
+        <p:nvPr/>
+      </p:nvGrpSpPr>
+      <p:grpSpPr>
+        <a:xfrm>
+          <a:off x="0" y="0"/>
+          <a:ext cx="0" cy="0"/>
+          <a:chOff x="0" y="0"/>
+          <a:chExt cx="0" cy="0"/>
+        </a:xfrm>
+      </p:grpSpPr>
+      <p:sp>
+        <p:nvSpPr>
+          <p:cNvPr id="2" name="Titre 1"/>
+          <p:cNvSpPr>
+            <a:spLocks noGrp="1"/>
+          </p:cNvSpPr>
+          <p:nvPr>
+            <p:ph type="title"/>
+          </p:nvPr>
+        </p:nvSpPr>
+        <p:spPr/>
+        <p:txBody>
+          <a:bodyPr/>
+          <a:lstStyle/>
+          <a:p>
+            <a:endParaRPr lang="fr-FR"/>
+          </a:p>
+        </p:txBody>
+      </p:sp>
+      <p:sp>
+        <p:nvSpPr>
+          <p:cNvPr id="3" name="Espace réservé du contenu 2"/>
+          <p:cNvSpPr>
+            <a:spLocks noGrp="1"/>
+          </p:cNvSpPr>
+          <p:nvPr>
+            <p:ph idx="1"/>
+          </p:nvPr>
+        </p:nvSpPr>
+        <p:spPr/>
+        <p:txBody>
+          <a:bodyPr/>
+          <a:lstStyle/>
+          <a:p>
+            <a:r>
+              <a:rPr lang="fr-FR" dirty="0"/>
+              <a:t>Me</a:t>
+            </a:r>
+            <a:r>
+              <a:rPr lang="fr-FR" b="1" dirty="0"/>
+              <a:t>ttre en place son environnement Front-End</a:t>
+            </a:r>
+            <a:r>
+              <a:rPr lang="fr-FR" dirty="0"/>
+              <a:t>❒ Le site est déployé grâce à Git, sans passer par un logiciel de FTP (avec </a:t>
+            </a:r>
+            <a:r>
+              <a:rPr lang="fr-FR" dirty="0" err="1"/>
+              <a:t>GitHub</a:t>
+            </a:r>
+            <a:r>
+              <a:rPr lang="fr-FR" dirty="0"/>
+              <a:t> Pages par exemple).</a:t>
+            </a:r>
+            <a:endParaRPr lang="fr-FR" dirty="0"/>
+          </a:p>
+        </p:txBody>
+      </p:sp>
+    </p:spTree>
+    <p:extLst>
+      <p:ext uri="{BB962C8B-B14F-4D97-AF65-F5344CB8AC3E}">
+        <p14:creationId xmlns:p14="http://schemas.microsoft.com/office/powerpoint/2010/main" val="1508676690"/>
       </p:ext>
     </p:extLst>
   </p:cSld>
@@ -5909,9 +6019,18 @@
               <a:rPr lang="fr-FR" dirty="0" smtClean="0"/>
               <a:t> » </a:t>
             </a:r>
+          </a:p>
+          <a:p>
+            <a:pPr marL="0" indent="0">
+              <a:buNone/>
+            </a:pPr>
+            <a:r>
+              <a:rPr lang="fr-FR" dirty="0" smtClean="0"/>
+              <a:t>de </a:t>
+            </a:r>
             <a:r>
               <a:rPr lang="fr-FR" dirty="0"/>
-              <a:t>de commande de repas en </a:t>
+              <a:t>commande de repas en </a:t>
             </a:r>
             <a:r>
               <a:rPr lang="fr-FR" dirty="0" smtClean="0"/>
@@ -6717,7 +6836,7 @@
             </a:r>
             <a:r>
               <a:rPr lang="fr-FR" dirty="0" smtClean="0"/>
-              <a:t>(767PX – 1200X</a:t>
+              <a:t>(768PX – 1200X</a:t>
             </a:r>
             <a:r>
               <a:rPr lang="fr-FR" dirty="0"/>
@@ -6784,6 +6903,462 @@
     <p:extLst>
       <p:ext uri="{BB962C8B-B14F-4D97-AF65-F5344CB8AC3E}">
         <p14:creationId xmlns:p14="http://schemas.microsoft.com/office/powerpoint/2010/main" val="593753580"/>
+      </p:ext>
+    </p:extLst>
+  </p:cSld>
+  <p:clrMapOvr>
+    <a:masterClrMapping/>
+  </p:clrMapOvr>
+</p:sld>
+</file>
+
+<file path=ppt/slides/slide6.xml><?xml version="1.0" encoding="utf-8"?>
+<p:sld xmlns:a="http://schemas.openxmlformats.org/drawingml/2006/main" xmlns:r="http://schemas.openxmlformats.org/officeDocument/2006/relationships" xmlns:p="http://schemas.openxmlformats.org/presentationml/2006/main">
+  <p:cSld>
+    <p:spTree>
+      <p:nvGrpSpPr>
+        <p:cNvPr id="1" name=""/>
+        <p:cNvGrpSpPr/>
+        <p:nvPr/>
+      </p:nvGrpSpPr>
+      <p:grpSpPr>
+        <a:xfrm>
+          <a:off x="0" y="0"/>
+          <a:ext cx="0" cy="0"/>
+          <a:chOff x="0" y="0"/>
+          <a:chExt cx="0" cy="0"/>
+        </a:xfrm>
+      </p:grpSpPr>
+      <p:sp>
+        <p:nvSpPr>
+          <p:cNvPr id="2" name="Titre 1"/>
+          <p:cNvSpPr>
+            <a:spLocks noGrp="1"/>
+          </p:cNvSpPr>
+          <p:nvPr>
+            <p:ph type="title"/>
+          </p:nvPr>
+        </p:nvSpPr>
+        <p:spPr/>
+        <p:txBody>
+          <a:bodyPr/>
+          <a:lstStyle/>
+          <a:p>
+            <a:r>
+              <a:rPr lang="fr-FR" dirty="0" smtClean="0"/>
+              <a:t>Mon support </a:t>
+            </a:r>
+            <a:endParaRPr lang="fr-FR" dirty="0"/>
+          </a:p>
+        </p:txBody>
+      </p:sp>
+      <p:sp>
+        <p:nvSpPr>
+          <p:cNvPr id="3" name="Espace réservé du contenu 2"/>
+          <p:cNvSpPr>
+            <a:spLocks noGrp="1"/>
+          </p:cNvSpPr>
+          <p:nvPr>
+            <p:ph idx="1"/>
+          </p:nvPr>
+        </p:nvSpPr>
+        <p:spPr/>
+        <p:txBody>
+          <a:bodyPr/>
+          <a:lstStyle/>
+          <a:p>
+            <a:r>
+              <a:rPr lang="fr-FR" b="1" dirty="0"/>
+              <a:t>Développer chaque page d'un site web de manière cohérente et structurée</a:t>
+            </a:r>
+            <a:endParaRPr lang="fr-FR" dirty="0"/>
+          </a:p>
+          <a:p>
+            <a:pPr fontAlgn="ctr"/>
+            <a:r>
+              <a:rPr lang="fr-FR" dirty="0"/>
+              <a:t>❒ La page HTML passe la validation W3C HTML sans erreur.</a:t>
+            </a:r>
+          </a:p>
+          <a:p>
+            <a:pPr fontAlgn="ctr"/>
+            <a:r>
+              <a:rPr lang="fr-FR" dirty="0"/>
+              <a:t>❒ Les balises HTML sont définies avec la sémantique HTML5 pertinente.</a:t>
+            </a:r>
+          </a:p>
+          <a:p>
+            <a:pPr fontAlgn="ctr"/>
+            <a:r>
+              <a:rPr lang="fr-FR" dirty="0"/>
+              <a:t>❒ Le code HTML et CSS est correctement indenté.</a:t>
+            </a:r>
+          </a:p>
+        </p:txBody>
+      </p:sp>
+    </p:spTree>
+    <p:extLst>
+      <p:ext uri="{BB962C8B-B14F-4D97-AF65-F5344CB8AC3E}">
+        <p14:creationId xmlns:p14="http://schemas.microsoft.com/office/powerpoint/2010/main" val="273453599"/>
+      </p:ext>
+    </p:extLst>
+  </p:cSld>
+  <p:clrMapOvr>
+    <a:masterClrMapping/>
+  </p:clrMapOvr>
+</p:sld>
+</file>
+
+<file path=ppt/slides/slide7.xml><?xml version="1.0" encoding="utf-8"?>
+<p:sld xmlns:a="http://schemas.openxmlformats.org/drawingml/2006/main" xmlns:r="http://schemas.openxmlformats.org/officeDocument/2006/relationships" xmlns:p="http://schemas.openxmlformats.org/presentationml/2006/main">
+  <p:cSld>
+    <p:spTree>
+      <p:nvGrpSpPr>
+        <p:cNvPr id="1" name=""/>
+        <p:cNvGrpSpPr/>
+        <p:nvPr/>
+      </p:nvGrpSpPr>
+      <p:grpSpPr>
+        <a:xfrm>
+          <a:off x="0" y="0"/>
+          <a:ext cx="0" cy="0"/>
+          <a:chOff x="0" y="0"/>
+          <a:chExt cx="0" cy="0"/>
+        </a:xfrm>
+      </p:grpSpPr>
+      <p:sp>
+        <p:nvSpPr>
+          <p:cNvPr id="2" name="Titre 1"/>
+          <p:cNvSpPr>
+            <a:spLocks noGrp="1"/>
+          </p:cNvSpPr>
+          <p:nvPr>
+            <p:ph type="title"/>
+          </p:nvPr>
+        </p:nvSpPr>
+        <p:spPr/>
+        <p:txBody>
+          <a:bodyPr/>
+          <a:lstStyle/>
+          <a:p>
+            <a:endParaRPr lang="fr-FR"/>
+          </a:p>
+        </p:txBody>
+      </p:sp>
+      <p:sp>
+        <p:nvSpPr>
+          <p:cNvPr id="3" name="Espace réservé du contenu 2"/>
+          <p:cNvSpPr>
+            <a:spLocks noGrp="1"/>
+          </p:cNvSpPr>
+          <p:nvPr>
+            <p:ph idx="1"/>
+          </p:nvPr>
+        </p:nvSpPr>
+        <p:spPr/>
+        <p:txBody>
+          <a:bodyPr/>
+          <a:lstStyle/>
+          <a:p>
+            <a:r>
+              <a:rPr lang="fr-FR" b="1" dirty="0"/>
+              <a:t>Assurer la cohérence graphique d'un site web</a:t>
+            </a:r>
+            <a:endParaRPr lang="fr-FR" dirty="0"/>
+          </a:p>
+          <a:p>
+            <a:pPr fontAlgn="ctr"/>
+            <a:r>
+              <a:rPr lang="fr-FR" dirty="0"/>
+              <a:t>❒ L'aspect visuel correspond à la maquette sur écran mobile.</a:t>
+            </a:r>
+          </a:p>
+          <a:p>
+            <a:pPr fontAlgn="ctr"/>
+            <a:r>
+              <a:rPr lang="fr-FR" dirty="0"/>
+              <a:t>❒ Aucun </a:t>
+            </a:r>
+            <a:r>
+              <a:rPr lang="fr-FR" dirty="0" err="1"/>
+              <a:t>framework</a:t>
+            </a:r>
+            <a:r>
+              <a:rPr lang="fr-FR" dirty="0"/>
+              <a:t> (type </a:t>
+            </a:r>
+            <a:r>
+              <a:rPr lang="fr-FR" dirty="0" err="1"/>
+              <a:t>Bootstrap</a:t>
+            </a:r>
+            <a:r>
+              <a:rPr lang="fr-FR" dirty="0"/>
+              <a:t>) n'est utilisé pour ce projet.</a:t>
+            </a:r>
+          </a:p>
+          <a:p>
+            <a:pPr fontAlgn="ctr"/>
+            <a:r>
+              <a:rPr lang="fr-FR" dirty="0"/>
+              <a:t>❒ La maquette s’adapte sur mobile, tablette et desktop.</a:t>
+            </a:r>
+          </a:p>
+          <a:p>
+            <a:pPr fontAlgn="ctr"/>
+            <a:r>
+              <a:rPr lang="fr-FR" dirty="0"/>
+              <a:t>❒ Le site s’affiche sans perte d’information et sans barre de défilement horizontale sur les différentes tailles (smartphone, tablette, écran de portable, écran fixe (au moins jusqu’à une résolution “</a:t>
+            </a:r>
+            <a:r>
+              <a:rPr lang="fr-FR" dirty="0" err="1"/>
+              <a:t>hd</a:t>
+            </a:r>
+            <a:r>
+              <a:rPr lang="fr-FR" dirty="0"/>
+              <a:t>” (1920*1080)).</a:t>
+            </a:r>
+          </a:p>
+          <a:p>
+            <a:endParaRPr lang="fr-FR" dirty="0"/>
+          </a:p>
+        </p:txBody>
+      </p:sp>
+    </p:spTree>
+    <p:extLst>
+      <p:ext uri="{BB962C8B-B14F-4D97-AF65-F5344CB8AC3E}">
+        <p14:creationId xmlns:p14="http://schemas.microsoft.com/office/powerpoint/2010/main" val="2659069542"/>
+      </p:ext>
+    </p:extLst>
+  </p:cSld>
+  <p:clrMapOvr>
+    <a:masterClrMapping/>
+  </p:clrMapOvr>
+</p:sld>
+</file>
+
+<file path=ppt/slides/slide8.xml><?xml version="1.0" encoding="utf-8"?>
+<p:sld xmlns:a="http://schemas.openxmlformats.org/drawingml/2006/main" xmlns:r="http://schemas.openxmlformats.org/officeDocument/2006/relationships" xmlns:p="http://schemas.openxmlformats.org/presentationml/2006/main">
+  <p:cSld>
+    <p:spTree>
+      <p:nvGrpSpPr>
+        <p:cNvPr id="1" name=""/>
+        <p:cNvGrpSpPr/>
+        <p:nvPr/>
+      </p:nvGrpSpPr>
+      <p:grpSpPr>
+        <a:xfrm>
+          <a:off x="0" y="0"/>
+          <a:ext cx="0" cy="0"/>
+          <a:chOff x="0" y="0"/>
+          <a:chExt cx="0" cy="0"/>
+        </a:xfrm>
+      </p:grpSpPr>
+      <p:sp>
+        <p:nvSpPr>
+          <p:cNvPr id="2" name="Titre 1"/>
+          <p:cNvSpPr>
+            <a:spLocks noGrp="1"/>
+          </p:cNvSpPr>
+          <p:nvPr>
+            <p:ph type="title"/>
+          </p:nvPr>
+        </p:nvSpPr>
+        <p:spPr/>
+        <p:txBody>
+          <a:bodyPr/>
+          <a:lstStyle/>
+          <a:p>
+            <a:endParaRPr lang="fr-FR"/>
+          </a:p>
+        </p:txBody>
+      </p:sp>
+      <p:sp>
+        <p:nvSpPr>
+          <p:cNvPr id="3" name="Espace réservé du contenu 2"/>
+          <p:cNvSpPr>
+            <a:spLocks noGrp="1"/>
+          </p:cNvSpPr>
+          <p:nvPr>
+            <p:ph idx="1"/>
+          </p:nvPr>
+        </p:nvSpPr>
+        <p:spPr/>
+        <p:txBody>
+          <a:bodyPr/>
+          <a:lstStyle/>
+          <a:p>
+            <a:r>
+              <a:rPr lang="fr-FR" b="1" dirty="0"/>
+              <a:t> Mettre en œuvre des effets CSS graphiques avancés</a:t>
+            </a:r>
+            <a:endParaRPr lang="fr-FR" dirty="0"/>
+          </a:p>
+          <a:p>
+            <a:pPr fontAlgn="ctr"/>
+            <a:r>
+              <a:rPr lang="fr-FR" dirty="0"/>
+              <a:t>❒ Toutes les animations demandées sont présentes.</a:t>
+            </a:r>
+          </a:p>
+          <a:p>
+            <a:pPr fontAlgn="ctr"/>
+            <a:r>
+              <a:rPr lang="fr-FR" dirty="0"/>
+              <a:t>❒ Le code CSS passe la validation W3C CSS.</a:t>
+            </a:r>
+          </a:p>
+          <a:p>
+            <a:pPr fontAlgn="ctr"/>
+            <a:r>
+              <a:rPr lang="fr-FR" dirty="0"/>
+              <a:t>❒ Le code CSS est écrit dans un ou plusieurs fichiers CSS.</a:t>
+            </a:r>
+          </a:p>
+          <a:p>
+            <a:pPr fontAlgn="ctr"/>
+            <a:r>
+              <a:rPr lang="fr-FR" dirty="0"/>
+              <a:t>❒ Aucun code CSS n'est appliqué via un attribut style dans une balise HTML.</a:t>
+            </a:r>
+          </a:p>
+        </p:txBody>
+      </p:sp>
+    </p:spTree>
+    <p:extLst>
+      <p:ext uri="{BB962C8B-B14F-4D97-AF65-F5344CB8AC3E}">
+        <p14:creationId xmlns:p14="http://schemas.microsoft.com/office/powerpoint/2010/main" val="3582809015"/>
+      </p:ext>
+    </p:extLst>
+  </p:cSld>
+  <p:clrMapOvr>
+    <a:masterClrMapping/>
+  </p:clrMapOvr>
+</p:sld>
+</file>
+
+<file path=ppt/slides/slide9.xml><?xml version="1.0" encoding="utf-8"?>
+<p:sld xmlns:a="http://schemas.openxmlformats.org/drawingml/2006/main" xmlns:r="http://schemas.openxmlformats.org/officeDocument/2006/relationships" xmlns:p="http://schemas.openxmlformats.org/presentationml/2006/main">
+  <p:cSld>
+    <p:spTree>
+      <p:nvGrpSpPr>
+        <p:cNvPr id="1" name=""/>
+        <p:cNvGrpSpPr/>
+        <p:nvPr/>
+      </p:nvGrpSpPr>
+      <p:grpSpPr>
+        <a:xfrm>
+          <a:off x="0" y="0"/>
+          <a:ext cx="0" cy="0"/>
+          <a:chOff x="0" y="0"/>
+          <a:chExt cx="0" cy="0"/>
+        </a:xfrm>
+      </p:grpSpPr>
+      <p:sp>
+        <p:nvSpPr>
+          <p:cNvPr id="2" name="Titre 1"/>
+          <p:cNvSpPr>
+            <a:spLocks noGrp="1"/>
+          </p:cNvSpPr>
+          <p:nvPr>
+            <p:ph type="title"/>
+          </p:nvPr>
+        </p:nvSpPr>
+        <p:spPr/>
+        <p:txBody>
+          <a:bodyPr/>
+          <a:lstStyle/>
+          <a:p>
+            <a:endParaRPr lang="fr-FR"/>
+          </a:p>
+        </p:txBody>
+      </p:sp>
+      <p:sp>
+        <p:nvSpPr>
+          <p:cNvPr id="3" name="Espace réservé du contenu 2"/>
+          <p:cNvSpPr>
+            <a:spLocks noGrp="1"/>
+          </p:cNvSpPr>
+          <p:nvPr>
+            <p:ph idx="1"/>
+          </p:nvPr>
+        </p:nvSpPr>
+        <p:spPr/>
+        <p:txBody>
+          <a:bodyPr/>
+          <a:lstStyle/>
+          <a:p>
+            <a:r>
+              <a:rPr lang="fr-FR" b="1" dirty="0"/>
+              <a:t>Utiliser un système de gestion de versions pour le suivi du projet et son </a:t>
+            </a:r>
+            <a:r>
+              <a:rPr lang="fr-FR" b="1" dirty="0" err="1"/>
+              <a:t>hébergement.</a:t>
+            </a:r>
+            <a:r>
+              <a:rPr lang="fr-FR" dirty="0" err="1"/>
+              <a:t>L</a:t>
+            </a:r>
+            <a:r>
+              <a:rPr lang="fr-FR" i="1" dirty="0" err="1"/>
+              <a:t>ivrable</a:t>
+            </a:r>
+            <a:r>
+              <a:rPr lang="fr-FR" i="1" dirty="0"/>
+              <a:t> : le projet </a:t>
+            </a:r>
+            <a:r>
+              <a:rPr lang="fr-FR" i="1" dirty="0" err="1"/>
+              <a:t>GitHub</a:t>
+            </a:r>
+            <a:r>
+              <a:rPr lang="fr-FR" i="1" dirty="0"/>
+              <a:t>.</a:t>
+            </a:r>
+            <a:r>
+              <a:rPr lang="fr-FR" dirty="0"/>
+              <a:t>❒ Le code de l’application est hébergé sur </a:t>
+            </a:r>
+            <a:r>
+              <a:rPr lang="fr-FR" dirty="0" err="1"/>
+              <a:t>GitHub</a:t>
+            </a:r>
+            <a:r>
+              <a:rPr lang="fr-FR" dirty="0"/>
+              <a:t> ou </a:t>
+            </a:r>
+            <a:r>
+              <a:rPr lang="fr-FR" dirty="0" err="1"/>
+              <a:t>GitLab</a:t>
+            </a:r>
+            <a:r>
+              <a:rPr lang="fr-FR" dirty="0"/>
+              <a:t>.</a:t>
+            </a:r>
+          </a:p>
+          <a:p>
+            <a:r>
+              <a:rPr lang="fr-FR" dirty="0"/>
+              <a:t>❒ Le </a:t>
+            </a:r>
+            <a:r>
+              <a:rPr lang="fr-FR" dirty="0" err="1"/>
+              <a:t>versionning</a:t>
+            </a:r>
+            <a:r>
+              <a:rPr lang="fr-FR" dirty="0"/>
+              <a:t> de l’application est effectué régulièrement.</a:t>
+            </a:r>
+          </a:p>
+          <a:p>
+            <a:endParaRPr lang="fr-FR" dirty="0"/>
+          </a:p>
+        </p:txBody>
+      </p:sp>
+    </p:spTree>
+    <p:extLst>
+      <p:ext uri="{BB962C8B-B14F-4D97-AF65-F5344CB8AC3E}">
+        <p14:creationId xmlns:p14="http://schemas.microsoft.com/office/powerpoint/2010/main" val="3834366843"/>
       </p:ext>
     </p:extLst>
   </p:cSld>

</xml_diff>